<commit_message>
Set the confirmationWindowSize setting in the bridge Artemis link. To reduce spam logging and improve performance.
Fixup doc pictures to match CRL config change
</commit_message>
<xml_diff>
--- a/docs/source/design/float/deployment/Bridge Configurations.pptx
+++ b/docs/source/design/float/deployment/Bridge Configurations.pptx
@@ -207,7 +207,7 @@
           <a:p>
             <a:fld id="{2C82E4B6-2456-4935-B807-26B7F91AC855}" type="datetimeFigureOut">
               <a:rPr lang="en-GB" smtClean="0"/>
-              <a:t>15/05/2018</a:t>
+              <a:t>17/05/2018</a:t>
             </a:fld>
             <a:endParaRPr lang="en-GB"/>
           </a:p>
@@ -708,7 +708,7 @@
           <a:p>
             <a:fld id="{72A4DE50-58D0-4AE8-8BAA-5262A4FF172B}" type="datetimeFigureOut">
               <a:rPr lang="en-GB" smtClean="0"/>
-              <a:t>15/05/2018</a:t>
+              <a:t>17/05/2018</a:t>
             </a:fld>
             <a:endParaRPr lang="en-GB"/>
           </a:p>
@@ -908,7 +908,7 @@
           <a:p>
             <a:fld id="{72A4DE50-58D0-4AE8-8BAA-5262A4FF172B}" type="datetimeFigureOut">
               <a:rPr lang="en-GB" smtClean="0"/>
-              <a:t>15/05/2018</a:t>
+              <a:t>17/05/2018</a:t>
             </a:fld>
             <a:endParaRPr lang="en-GB"/>
           </a:p>
@@ -1118,7 +1118,7 @@
           <a:p>
             <a:fld id="{72A4DE50-58D0-4AE8-8BAA-5262A4FF172B}" type="datetimeFigureOut">
               <a:rPr lang="en-GB" smtClean="0"/>
-              <a:t>15/05/2018</a:t>
+              <a:t>17/05/2018</a:t>
             </a:fld>
             <a:endParaRPr lang="en-GB"/>
           </a:p>
@@ -1318,7 +1318,7 @@
           <a:p>
             <a:fld id="{72A4DE50-58D0-4AE8-8BAA-5262A4FF172B}" type="datetimeFigureOut">
               <a:rPr lang="en-GB" smtClean="0"/>
-              <a:t>15/05/2018</a:t>
+              <a:t>17/05/2018</a:t>
             </a:fld>
             <a:endParaRPr lang="en-GB"/>
           </a:p>
@@ -1594,7 +1594,7 @@
           <a:p>
             <a:fld id="{72A4DE50-58D0-4AE8-8BAA-5262A4FF172B}" type="datetimeFigureOut">
               <a:rPr lang="en-GB" smtClean="0"/>
-              <a:t>15/05/2018</a:t>
+              <a:t>17/05/2018</a:t>
             </a:fld>
             <a:endParaRPr lang="en-GB"/>
           </a:p>
@@ -1862,7 +1862,7 @@
           <a:p>
             <a:fld id="{72A4DE50-58D0-4AE8-8BAA-5262A4FF172B}" type="datetimeFigureOut">
               <a:rPr lang="en-GB" smtClean="0"/>
-              <a:t>15/05/2018</a:t>
+              <a:t>17/05/2018</a:t>
             </a:fld>
             <a:endParaRPr lang="en-GB"/>
           </a:p>
@@ -2277,7 +2277,7 @@
           <a:p>
             <a:fld id="{72A4DE50-58D0-4AE8-8BAA-5262A4FF172B}" type="datetimeFigureOut">
               <a:rPr lang="en-GB" smtClean="0"/>
-              <a:t>15/05/2018</a:t>
+              <a:t>17/05/2018</a:t>
             </a:fld>
             <a:endParaRPr lang="en-GB"/>
           </a:p>
@@ -2419,7 +2419,7 @@
           <a:p>
             <a:fld id="{72A4DE50-58D0-4AE8-8BAA-5262A4FF172B}" type="datetimeFigureOut">
               <a:rPr lang="en-GB" smtClean="0"/>
-              <a:t>15/05/2018</a:t>
+              <a:t>17/05/2018</a:t>
             </a:fld>
             <a:endParaRPr lang="en-GB"/>
           </a:p>
@@ -2532,7 +2532,7 @@
           <a:p>
             <a:fld id="{72A4DE50-58D0-4AE8-8BAA-5262A4FF172B}" type="datetimeFigureOut">
               <a:rPr lang="en-GB" smtClean="0"/>
-              <a:t>15/05/2018</a:t>
+              <a:t>17/05/2018</a:t>
             </a:fld>
             <a:endParaRPr lang="en-GB"/>
           </a:p>
@@ -2845,7 +2845,7 @@
           <a:p>
             <a:fld id="{72A4DE50-58D0-4AE8-8BAA-5262A4FF172B}" type="datetimeFigureOut">
               <a:rPr lang="en-GB" smtClean="0"/>
-              <a:t>15/05/2018</a:t>
+              <a:t>17/05/2018</a:t>
             </a:fld>
             <a:endParaRPr lang="en-GB"/>
           </a:p>
@@ -3134,7 +3134,7 @@
           <a:p>
             <a:fld id="{72A4DE50-58D0-4AE8-8BAA-5262A4FF172B}" type="datetimeFigureOut">
               <a:rPr lang="en-GB" smtClean="0"/>
-              <a:t>15/05/2018</a:t>
+              <a:t>17/05/2018</a:t>
             </a:fld>
             <a:endParaRPr lang="en-GB"/>
           </a:p>
@@ -3377,7 +3377,7 @@
           <a:p>
             <a:fld id="{72A4DE50-58D0-4AE8-8BAA-5262A4FF172B}" type="datetimeFigureOut">
               <a:rPr lang="en-GB" smtClean="0"/>
-              <a:t>15/05/2018</a:t>
+              <a:t>17/05/2018</a:t>
             </a:fld>
             <a:endParaRPr lang="en-GB"/>
           </a:p>
@@ -9196,8 +9196,8 @@
         </p:nvSpPr>
         <p:spPr>
           <a:xfrm>
-            <a:off x="3097791" y="3181743"/>
-            <a:ext cx="4513130" cy="3539430"/>
+            <a:off x="3101855" y="3181743"/>
+            <a:ext cx="4513130" cy="3662541"/>
           </a:xfrm>
           <a:prstGeom prst="rect">
             <a:avLst/>
@@ -9210,7 +9210,7 @@
           </a:ln>
         </p:spPr>
         <p:txBody>
-          <a:bodyPr wrap="square" rtlCol="0">
+          <a:bodyPr wrap="square" tIns="0" bIns="0" rtlCol="0">
             <a:spAutoFit/>
           </a:bodyPr>
           <a:lstStyle/>
@@ -9737,7 +9737,39 @@
                 <a:latin typeface="Courier New" panose="02070309020205020404" pitchFamily="49" charset="0"/>
                 <a:cs typeface="Courier New" panose="02070309020205020404" pitchFamily="49" charset="0"/>
               </a:rPr>
-              <a:t>"</a:t>
+              <a:t>“</a:t>
+            </a:r>
+          </a:p>
+          <a:p>
+            <a:r>
+              <a:rPr lang="en-GB" sz="800" dirty="0">
+                <a:solidFill>
+                  <a:srgbClr val="FF0000"/>
+                </a:solidFill>
+                <a:latin typeface="Courier New" panose="02070309020205020404" pitchFamily="49" charset="0"/>
+                <a:cs typeface="Courier New" panose="02070309020205020404" pitchFamily="49" charset="0"/>
+              </a:rPr>
+              <a:t>           </a:t>
+            </a:r>
+            <a:r>
+              <a:rPr lang="en-GB" sz="800" dirty="0" err="1">
+                <a:solidFill>
+                  <a:srgbClr val="FF0000"/>
+                </a:solidFill>
+                <a:latin typeface="Courier New" panose="02070309020205020404" pitchFamily="49" charset="0"/>
+                <a:cs typeface="Courier New" panose="02070309020205020404" pitchFamily="49" charset="0"/>
+              </a:rPr>
+              <a:t>crlCheckSoftFail</a:t>
+            </a:r>
+            <a:r>
+              <a:rPr lang="en-GB" sz="800" dirty="0">
+                <a:solidFill>
+                  <a:srgbClr val="FF0000"/>
+                </a:solidFill>
+                <a:latin typeface="Courier New" panose="02070309020205020404" pitchFamily="49" charset="0"/>
+                <a:cs typeface="Courier New" panose="02070309020205020404" pitchFamily="49" charset="0"/>
+              </a:rPr>
+              <a:t> = true</a:t>
             </a:r>
           </a:p>
           <a:p>
@@ -9867,7 +9899,7 @@
         <p:spPr>
           <a:xfrm>
             <a:off x="7761240" y="3674185"/>
-            <a:ext cx="4306648" cy="3046988"/>
+            <a:ext cx="4306648" cy="3170099"/>
           </a:xfrm>
           <a:prstGeom prst="rect">
             <a:avLst/>
@@ -9880,7 +9912,7 @@
           </a:ln>
         </p:spPr>
         <p:txBody>
-          <a:bodyPr wrap="square" rtlCol="0">
+          <a:bodyPr wrap="square" tIns="0" bIns="0" rtlCol="0">
             <a:spAutoFit/>
           </a:bodyPr>
           <a:lstStyle/>
@@ -10425,7 +10457,39 @@
                 <a:latin typeface="Courier New" panose="02070309020205020404" pitchFamily="49" charset="0"/>
                 <a:cs typeface="Courier New" panose="02070309020205020404" pitchFamily="49" charset="0"/>
               </a:rPr>
-              <a:t>"</a:t>
+              <a:t>“</a:t>
+            </a:r>
+          </a:p>
+          <a:p>
+            <a:r>
+              <a:rPr lang="en-GB" sz="800" dirty="0">
+                <a:solidFill>
+                  <a:srgbClr val="FF0000"/>
+                </a:solidFill>
+                <a:latin typeface="Courier New" panose="02070309020205020404" pitchFamily="49" charset="0"/>
+                <a:cs typeface="Courier New" panose="02070309020205020404" pitchFamily="49" charset="0"/>
+              </a:rPr>
+              <a:t>           </a:t>
+            </a:r>
+            <a:r>
+              <a:rPr lang="en-GB" sz="800" dirty="0" err="1">
+                <a:solidFill>
+                  <a:srgbClr val="FF0000"/>
+                </a:solidFill>
+                <a:latin typeface="Courier New" panose="02070309020205020404" pitchFamily="49" charset="0"/>
+                <a:cs typeface="Courier New" panose="02070309020205020404" pitchFamily="49" charset="0"/>
+              </a:rPr>
+              <a:t>crlCheckSoftFail</a:t>
+            </a:r>
+            <a:r>
+              <a:rPr lang="en-GB" sz="800" dirty="0">
+                <a:solidFill>
+                  <a:srgbClr val="FF0000"/>
+                </a:solidFill>
+                <a:latin typeface="Courier New" panose="02070309020205020404" pitchFamily="49" charset="0"/>
+                <a:cs typeface="Courier New" panose="02070309020205020404" pitchFamily="49" charset="0"/>
+              </a:rPr>
+              <a:t> = true</a:t>
             </a:r>
           </a:p>
           <a:p>
@@ -12536,7 +12600,7 @@
         <p:spPr>
           <a:xfrm>
             <a:off x="3132717" y="3084403"/>
-            <a:ext cx="4513130" cy="3785652"/>
+            <a:ext cx="4513130" cy="3754874"/>
           </a:xfrm>
           <a:prstGeom prst="rect">
             <a:avLst/>
@@ -12549,7 +12613,7 @@
           </a:ln>
         </p:spPr>
         <p:txBody>
-          <a:bodyPr wrap="square" rtlCol="0">
+          <a:bodyPr wrap="square" tIns="0" bIns="0" rtlCol="0">
             <a:spAutoFit/>
           </a:bodyPr>
           <a:lstStyle/>
@@ -13073,7 +13137,30 @@
                 <a:latin typeface="Courier New" panose="02070309020205020404" pitchFamily="49" charset="0"/>
                 <a:cs typeface="Courier New" panose="02070309020205020404" pitchFamily="49" charset="0"/>
               </a:rPr>
-              <a:t>"</a:t>
+              <a:t>“</a:t>
+            </a:r>
+          </a:p>
+          <a:p>
+            <a:r>
+              <a:rPr lang="en-GB" sz="800" dirty="0">
+                <a:latin typeface="Courier New" panose="02070309020205020404" pitchFamily="49" charset="0"/>
+                <a:cs typeface="Courier New" panose="02070309020205020404" pitchFamily="49" charset="0"/>
+              </a:rPr>
+              <a:t>           </a:t>
+            </a:r>
+            <a:r>
+              <a:rPr lang="en-GB" sz="800" dirty="0" err="1">
+                <a:latin typeface="Courier New" panose="02070309020205020404" pitchFamily="49" charset="0"/>
+                <a:cs typeface="Courier New" panose="02070309020205020404" pitchFamily="49" charset="0"/>
+              </a:rPr>
+              <a:t>crlCheckSoftFail</a:t>
+            </a:r>
+            <a:r>
+              <a:rPr lang="en-GB" sz="800" dirty="0">
+                <a:latin typeface="Courier New" panose="02070309020205020404" pitchFamily="49" charset="0"/>
+                <a:cs typeface="Courier New" panose="02070309020205020404" pitchFamily="49" charset="0"/>
+              </a:rPr>
+              <a:t> = true</a:t>
             </a:r>
           </a:p>
           <a:p>
@@ -13121,54 +13208,54 @@
           </a:p>
           <a:p>
             <a:r>
-              <a:rPr lang="en-GB" sz="1600" dirty="0" err="1">
+              <a:rPr lang="en-GB" sz="1400" dirty="0" err="1">
                 <a:latin typeface="Times New Roman" panose="02020603050405020304" pitchFamily="18" charset="0"/>
                 <a:cs typeface="Times New Roman" panose="02020603050405020304" pitchFamily="18" charset="0"/>
               </a:rPr>
               <a:t>truststore.jks</a:t>
             </a:r>
             <a:r>
-              <a:rPr lang="en-GB" sz="1600" dirty="0">
+              <a:rPr lang="en-GB" sz="1400" dirty="0">
                 <a:latin typeface="Times New Roman" panose="02020603050405020304" pitchFamily="18" charset="0"/>
                 <a:cs typeface="Times New Roman" panose="02020603050405020304" pitchFamily="18" charset="0"/>
               </a:rPr>
               <a:t>, </a:t>
             </a:r>
             <a:r>
-              <a:rPr lang="en-GB" sz="1600" dirty="0" err="1">
+              <a:rPr lang="en-GB" sz="1400" dirty="0" err="1">
                 <a:latin typeface="Times New Roman" panose="02020603050405020304" pitchFamily="18" charset="0"/>
                 <a:cs typeface="Times New Roman" panose="02020603050405020304" pitchFamily="18" charset="0"/>
               </a:rPr>
               <a:t>sslkeystore.jks</a:t>
             </a:r>
-            <a:endParaRPr lang="en-GB" sz="1600" dirty="0">
+            <a:endParaRPr lang="en-GB" sz="1400" dirty="0">
               <a:latin typeface="Times New Roman" panose="02020603050405020304" pitchFamily="18" charset="0"/>
               <a:cs typeface="Times New Roman" panose="02020603050405020304" pitchFamily="18" charset="0"/>
             </a:endParaRPr>
           </a:p>
           <a:p>
             <a:r>
-              <a:rPr lang="en-GB" sz="1600" dirty="0" err="1">
+              <a:rPr lang="en-GB" sz="1400" dirty="0" err="1">
                 <a:latin typeface="Times New Roman" panose="02020603050405020304" pitchFamily="18" charset="0"/>
                 <a:cs typeface="Times New Roman" panose="02020603050405020304" pitchFamily="18" charset="0"/>
               </a:rPr>
               <a:t>bridge.jks</a:t>
             </a:r>
             <a:r>
-              <a:rPr lang="en-GB" sz="1600" dirty="0">
+              <a:rPr lang="en-GB" sz="1400" dirty="0">
                 <a:latin typeface="Times New Roman" panose="02020603050405020304" pitchFamily="18" charset="0"/>
                 <a:cs typeface="Times New Roman" panose="02020603050405020304" pitchFamily="18" charset="0"/>
               </a:rPr>
               <a:t>, </a:t>
             </a:r>
             <a:r>
-              <a:rPr lang="en-GB" sz="1600" dirty="0" err="1">
+              <a:rPr lang="en-GB" sz="1400" dirty="0" err="1">
                 <a:latin typeface="Times New Roman" panose="02020603050405020304" pitchFamily="18" charset="0"/>
                 <a:cs typeface="Times New Roman" panose="02020603050405020304" pitchFamily="18" charset="0"/>
               </a:rPr>
               <a:t>trust.jks</a:t>
             </a:r>
-            <a:endParaRPr lang="en-GB" sz="1600" dirty="0">
+            <a:endParaRPr lang="en-GB" sz="1400" dirty="0">
               <a:latin typeface="Times New Roman" panose="02020603050405020304" pitchFamily="18" charset="0"/>
               <a:cs typeface="Times New Roman" panose="02020603050405020304" pitchFamily="18" charset="0"/>
             </a:endParaRPr>
@@ -13190,7 +13277,7 @@
         <p:spPr>
           <a:xfrm>
             <a:off x="7761240" y="3674185"/>
-            <a:ext cx="4306648" cy="3046988"/>
+            <a:ext cx="4306648" cy="3170099"/>
           </a:xfrm>
           <a:prstGeom prst="rect">
             <a:avLst/>
@@ -13203,7 +13290,7 @@
           </a:ln>
         </p:spPr>
         <p:txBody>
-          <a:bodyPr wrap="square" rtlCol="0">
+          <a:bodyPr wrap="square" tIns="0" bIns="0" rtlCol="0">
             <a:spAutoFit/>
           </a:bodyPr>
           <a:lstStyle/>
@@ -13595,7 +13682,30 @@
                 <a:latin typeface="Courier New" panose="02070309020205020404" pitchFamily="49" charset="0"/>
                 <a:cs typeface="Courier New" panose="02070309020205020404" pitchFamily="49" charset="0"/>
               </a:rPr>
-              <a:t>"</a:t>
+              <a:t>“</a:t>
+            </a:r>
+          </a:p>
+          <a:p>
+            <a:r>
+              <a:rPr lang="en-GB" sz="800" dirty="0">
+                <a:latin typeface="Courier New" panose="02070309020205020404" pitchFamily="49" charset="0"/>
+                <a:cs typeface="Courier New" panose="02070309020205020404" pitchFamily="49" charset="0"/>
+              </a:rPr>
+              <a:t>           </a:t>
+            </a:r>
+            <a:r>
+              <a:rPr lang="en-GB" sz="800" dirty="0" err="1">
+                <a:latin typeface="Courier New" panose="02070309020205020404" pitchFamily="49" charset="0"/>
+                <a:cs typeface="Courier New" panose="02070309020205020404" pitchFamily="49" charset="0"/>
+              </a:rPr>
+              <a:t>crlCheckSoftFail</a:t>
+            </a:r>
+            <a:r>
+              <a:rPr lang="en-GB" sz="800" dirty="0">
+                <a:latin typeface="Courier New" panose="02070309020205020404" pitchFamily="49" charset="0"/>
+                <a:cs typeface="Courier New" panose="02070309020205020404" pitchFamily="49" charset="0"/>
+              </a:rPr>
+              <a:t> = true</a:t>
             </a:r>
           </a:p>
           <a:p>
@@ -16084,7 +16194,7 @@
         <p:spPr>
           <a:xfrm>
             <a:off x="3191341" y="3180965"/>
-            <a:ext cx="4513130" cy="3539430"/>
+            <a:ext cx="4513130" cy="3662541"/>
           </a:xfrm>
           <a:prstGeom prst="rect">
             <a:avLst/>
@@ -16495,7 +16605,30 @@
                 <a:latin typeface="Courier New" panose="02070309020205020404" pitchFamily="49" charset="0"/>
                 <a:cs typeface="Courier New" panose="02070309020205020404" pitchFamily="49" charset="0"/>
               </a:rPr>
-              <a:t>"</a:t>
+              <a:t>“</a:t>
+            </a:r>
+          </a:p>
+          <a:p>
+            <a:r>
+              <a:rPr lang="en-GB" sz="800" dirty="0">
+                <a:latin typeface="Courier New" panose="02070309020205020404" pitchFamily="49" charset="0"/>
+                <a:cs typeface="Courier New" panose="02070309020205020404" pitchFamily="49" charset="0"/>
+              </a:rPr>
+              <a:t>           </a:t>
+            </a:r>
+            <a:r>
+              <a:rPr lang="en-GB" sz="800" dirty="0" err="1">
+                <a:latin typeface="Courier New" panose="02070309020205020404" pitchFamily="49" charset="0"/>
+                <a:cs typeface="Courier New" panose="02070309020205020404" pitchFamily="49" charset="0"/>
+              </a:rPr>
+              <a:t>crlCheckSoftFail</a:t>
+            </a:r>
+            <a:r>
+              <a:rPr lang="en-GB" sz="800" dirty="0">
+                <a:latin typeface="Courier New" panose="02070309020205020404" pitchFamily="49" charset="0"/>
+                <a:cs typeface="Courier New" panose="02070309020205020404" pitchFamily="49" charset="0"/>
+              </a:rPr>
+              <a:t> = true</a:t>
             </a:r>
           </a:p>
           <a:p>
@@ -16610,7 +16743,7 @@
         <p:spPr>
           <a:xfrm>
             <a:off x="7777903" y="3674185"/>
-            <a:ext cx="4306648" cy="3046988"/>
+            <a:ext cx="4306648" cy="3170099"/>
           </a:xfrm>
           <a:prstGeom prst="rect">
             <a:avLst/>
@@ -17015,7 +17148,30 @@
                 <a:latin typeface="Courier New" panose="02070309020205020404" pitchFamily="49" charset="0"/>
                 <a:cs typeface="Courier New" panose="02070309020205020404" pitchFamily="49" charset="0"/>
               </a:rPr>
-              <a:t>"</a:t>
+              <a:t>“</a:t>
+            </a:r>
+          </a:p>
+          <a:p>
+            <a:r>
+              <a:rPr lang="en-GB" sz="800" dirty="0">
+                <a:latin typeface="Courier New" panose="02070309020205020404" pitchFamily="49" charset="0"/>
+                <a:cs typeface="Courier New" panose="02070309020205020404" pitchFamily="49" charset="0"/>
+              </a:rPr>
+              <a:t>           </a:t>
+            </a:r>
+            <a:r>
+              <a:rPr lang="en-GB" sz="800" dirty="0" err="1">
+                <a:latin typeface="Courier New" panose="02070309020205020404" pitchFamily="49" charset="0"/>
+                <a:cs typeface="Courier New" panose="02070309020205020404" pitchFamily="49" charset="0"/>
+              </a:rPr>
+              <a:t>crlCheckSoftFail</a:t>
+            </a:r>
+            <a:r>
+              <a:rPr lang="en-GB" sz="800" dirty="0">
+                <a:latin typeface="Courier New" panose="02070309020205020404" pitchFamily="49" charset="0"/>
+                <a:cs typeface="Courier New" panose="02070309020205020404" pitchFamily="49" charset="0"/>
+              </a:rPr>
+              <a:t> = true</a:t>
             </a:r>
           </a:p>
           <a:p>
@@ -19643,7 +19799,7 @@
         <p:spPr>
           <a:xfrm>
             <a:off x="3117851" y="4040361"/>
-            <a:ext cx="4513130" cy="2800767"/>
+            <a:ext cx="4513130" cy="2831544"/>
           </a:xfrm>
           <a:prstGeom prst="rect">
             <a:avLst/>
@@ -20058,7 +20214,30 @@
                 <a:latin typeface="Courier New" panose="02070309020205020404" pitchFamily="49" charset="0"/>
                 <a:cs typeface="Courier New" panose="02070309020205020404" pitchFamily="49" charset="0"/>
               </a:rPr>
-              <a:t>"</a:t>
+              <a:t>“</a:t>
+            </a:r>
+          </a:p>
+          <a:p>
+            <a:r>
+              <a:rPr lang="en-GB" sz="800" dirty="0">
+                <a:latin typeface="Courier New" panose="02070309020205020404" pitchFamily="49" charset="0"/>
+                <a:cs typeface="Courier New" panose="02070309020205020404" pitchFamily="49" charset="0"/>
+              </a:rPr>
+              <a:t>           </a:t>
+            </a:r>
+            <a:r>
+              <a:rPr lang="en-GB" sz="800" dirty="0" err="1">
+                <a:latin typeface="Courier New" panose="02070309020205020404" pitchFamily="49" charset="0"/>
+                <a:cs typeface="Courier New" panose="02070309020205020404" pitchFamily="49" charset="0"/>
+              </a:rPr>
+              <a:t>crlCheckSoftFail</a:t>
+            </a:r>
+            <a:r>
+              <a:rPr lang="en-GB" sz="800" dirty="0">
+                <a:latin typeface="Courier New" panose="02070309020205020404" pitchFamily="49" charset="0"/>
+                <a:cs typeface="Courier New" panose="02070309020205020404" pitchFamily="49" charset="0"/>
+              </a:rPr>
+              <a:t> = true</a:t>
             </a:r>
           </a:p>
           <a:p>
@@ -20218,7 +20397,7 @@
         <p:spPr>
           <a:xfrm>
             <a:off x="7790603" y="4470798"/>
-            <a:ext cx="4306648" cy="2308324"/>
+            <a:ext cx="4306648" cy="2431435"/>
           </a:xfrm>
           <a:prstGeom prst="rect">
             <a:avLst/>
@@ -20647,7 +20826,30 @@
                 <a:latin typeface="Courier New" panose="02070309020205020404" pitchFamily="49" charset="0"/>
                 <a:cs typeface="Courier New" panose="02070309020205020404" pitchFamily="49" charset="0"/>
               </a:rPr>
-              <a:t>"</a:t>
+              <a:t>“</a:t>
+            </a:r>
+          </a:p>
+          <a:p>
+            <a:r>
+              <a:rPr lang="en-GB" sz="800" dirty="0">
+                <a:latin typeface="Courier New" panose="02070309020205020404" pitchFamily="49" charset="0"/>
+                <a:cs typeface="Courier New" panose="02070309020205020404" pitchFamily="49" charset="0"/>
+              </a:rPr>
+              <a:t>           </a:t>
+            </a:r>
+            <a:r>
+              <a:rPr lang="en-GB" sz="800" dirty="0" err="1">
+                <a:latin typeface="Courier New" panose="02070309020205020404" pitchFamily="49" charset="0"/>
+                <a:cs typeface="Courier New" panose="02070309020205020404" pitchFamily="49" charset="0"/>
+              </a:rPr>
+              <a:t>crlCheckSoftFail</a:t>
+            </a:r>
+            <a:r>
+              <a:rPr lang="en-GB" sz="800" dirty="0">
+                <a:latin typeface="Courier New" panose="02070309020205020404" pitchFamily="49" charset="0"/>
+                <a:cs typeface="Courier New" panose="02070309020205020404" pitchFamily="49" charset="0"/>
+              </a:rPr>
+              <a:t> = true</a:t>
             </a:r>
           </a:p>
           <a:p>
@@ -22754,7 +22956,7 @@
         <p:spPr>
           <a:xfrm>
             <a:off x="3080592" y="3970238"/>
-            <a:ext cx="4513130" cy="2867896"/>
+            <a:ext cx="4513130" cy="2766911"/>
           </a:xfrm>
           <a:prstGeom prst="rect">
             <a:avLst/>
@@ -22786,41 +22988,41 @@
           </a:p>
           <a:p>
             <a:r>
-              <a:rPr lang="en-GB" sz="800" dirty="0" err="1">
+              <a:rPr lang="en-GB" sz="780" dirty="0" err="1">
                 <a:latin typeface="Courier New" panose="02070309020205020404" pitchFamily="49" charset="0"/>
                 <a:cs typeface="Courier New" panose="02070309020205020404" pitchFamily="49" charset="0"/>
               </a:rPr>
               <a:t>bridgeMode</a:t>
             </a:r>
             <a:r>
-              <a:rPr lang="en-GB" sz="800" dirty="0">
+              <a:rPr lang="en-GB" sz="780" dirty="0">
                 <a:latin typeface="Courier New" panose="02070309020205020404" pitchFamily="49" charset="0"/>
                 <a:cs typeface="Courier New" panose="02070309020205020404" pitchFamily="49" charset="0"/>
               </a:rPr>
               <a:t> = </a:t>
             </a:r>
             <a:r>
-              <a:rPr lang="en-GB" sz="800" dirty="0" err="1">
+              <a:rPr lang="en-GB" sz="780" dirty="0" err="1">
                 <a:latin typeface="Courier New" panose="02070309020205020404" pitchFamily="49" charset="0"/>
                 <a:cs typeface="Courier New" panose="02070309020205020404" pitchFamily="49" charset="0"/>
               </a:rPr>
               <a:t>BridgeInner</a:t>
             </a:r>
-            <a:endParaRPr lang="en-GB" sz="800" dirty="0">
+            <a:endParaRPr lang="en-GB" sz="780" dirty="0">
               <a:latin typeface="Courier New" panose="02070309020205020404" pitchFamily="49" charset="0"/>
               <a:cs typeface="Courier New" panose="02070309020205020404" pitchFamily="49" charset="0"/>
             </a:endParaRPr>
           </a:p>
           <a:p>
             <a:r>
-              <a:rPr lang="en-GB" sz="800" dirty="0" err="1">
+              <a:rPr lang="en-GB" sz="780" dirty="0" err="1">
                 <a:latin typeface="Courier New" panose="02070309020205020404" pitchFamily="49" charset="0"/>
                 <a:cs typeface="Courier New" panose="02070309020205020404" pitchFamily="49" charset="0"/>
               </a:rPr>
               <a:t>outboundConfig</a:t>
             </a:r>
             <a:r>
-              <a:rPr lang="en-GB" sz="800" dirty="0">
+              <a:rPr lang="en-GB" sz="780" dirty="0">
                 <a:latin typeface="Courier New" panose="02070309020205020404" pitchFamily="49" charset="0"/>
                 <a:cs typeface="Courier New" panose="02070309020205020404" pitchFamily="49" charset="0"/>
               </a:rPr>
@@ -22829,7 +23031,7 @@
           </a:p>
           <a:p>
             <a:r>
-              <a:rPr lang="en-GB" sz="800" dirty="0">
+              <a:rPr lang="en-GB" sz="780" dirty="0">
                 <a:solidFill>
                   <a:srgbClr val="FF0000"/>
                 </a:solidFill>
@@ -22839,7 +23041,7 @@
               <a:t>    </a:t>
             </a:r>
             <a:r>
-              <a:rPr lang="en-GB" sz="800" dirty="0" err="1">
+              <a:rPr lang="en-GB" sz="780" dirty="0" err="1">
                 <a:solidFill>
                   <a:srgbClr val="FF0000"/>
                 </a:solidFill>
@@ -22849,7 +23051,7 @@
               <a:t>artemisBrokerAddress</a:t>
             </a:r>
             <a:r>
-              <a:rPr lang="en-GB" sz="800" dirty="0">
+              <a:rPr lang="en-GB" sz="780" dirty="0">
                 <a:solidFill>
                   <a:srgbClr val="FF0000"/>
                 </a:solidFill>
@@ -22859,7 +23061,7 @@
               <a:t> = "nodeserver1:11005</a:t>
             </a:r>
             <a:r>
-              <a:rPr lang="en-US" altLang="en-US" sz="800" dirty="0">
+              <a:rPr lang="en-US" altLang="en-US" sz="780" dirty="0">
                 <a:solidFill>
                   <a:srgbClr val="FF0000"/>
                 </a:solidFill>
@@ -22871,7 +23073,7 @@
           </a:p>
           <a:p>
             <a:r>
-              <a:rPr lang="en-US" sz="800" dirty="0">
+              <a:rPr lang="en-US" sz="780" dirty="0">
                 <a:solidFill>
                   <a:srgbClr val="FF0000"/>
                 </a:solidFill>
@@ -22881,7 +23083,7 @@
               <a:t>    </a:t>
             </a:r>
             <a:r>
-              <a:rPr lang="en-GB" sz="800" dirty="0" err="1">
+              <a:rPr lang="en-GB" sz="780" dirty="0" err="1">
                 <a:solidFill>
                   <a:srgbClr val="FF0000"/>
                 </a:solidFill>
@@ -22891,7 +23093,7 @@
               <a:t>alternateArtemisBrokerAddresses</a:t>
             </a:r>
             <a:r>
-              <a:rPr lang="en-GB" sz="800" dirty="0">
+              <a:rPr lang="en-GB" sz="780" dirty="0">
                 <a:solidFill>
                   <a:srgbClr val="FF0000"/>
                 </a:solidFill>
@@ -22903,7 +23105,7 @@
           </a:p>
           <a:p>
             <a:r>
-              <a:rPr lang="en-GB" sz="800" dirty="0">
+              <a:rPr lang="en-GB" sz="780" dirty="0">
                 <a:latin typeface="Courier New" panose="02070309020205020404" pitchFamily="49" charset="0"/>
                 <a:cs typeface="Courier New" panose="02070309020205020404" pitchFamily="49" charset="0"/>
               </a:rPr>
@@ -22912,14 +23114,14 @@
           </a:p>
           <a:p>
             <a:r>
-              <a:rPr lang="en-GB" sz="800" dirty="0" err="1">
+              <a:rPr lang="en-GB" sz="780" dirty="0" err="1">
                 <a:latin typeface="Courier New" panose="02070309020205020404" pitchFamily="49" charset="0"/>
                 <a:cs typeface="Courier New" panose="02070309020205020404" pitchFamily="49" charset="0"/>
               </a:rPr>
               <a:t>bridgeInnerConfig</a:t>
             </a:r>
             <a:r>
-              <a:rPr lang="en-GB" sz="800" dirty="0">
+              <a:rPr lang="en-GB" sz="780" dirty="0">
                 <a:latin typeface="Courier New" panose="02070309020205020404" pitchFamily="49" charset="0"/>
                 <a:cs typeface="Courier New" panose="02070309020205020404" pitchFamily="49" charset="0"/>
               </a:rPr>
@@ -22928,21 +23130,21 @@
           </a:p>
           <a:p>
             <a:r>
-              <a:rPr lang="en-GB" sz="800" dirty="0">
+              <a:rPr lang="en-GB" sz="780" dirty="0">
                 <a:latin typeface="Courier New" panose="02070309020205020404" pitchFamily="49" charset="0"/>
                 <a:cs typeface="Courier New" panose="02070309020205020404" pitchFamily="49" charset="0"/>
               </a:rPr>
               <a:t>    </a:t>
             </a:r>
             <a:r>
-              <a:rPr lang="en-GB" sz="800" dirty="0" err="1">
+              <a:rPr lang="en-GB" sz="780" dirty="0" err="1">
                 <a:latin typeface="Courier New" panose="02070309020205020404" pitchFamily="49" charset="0"/>
                 <a:cs typeface="Courier New" panose="02070309020205020404" pitchFamily="49" charset="0"/>
               </a:rPr>
               <a:t>floatAddresses</a:t>
             </a:r>
             <a:r>
-              <a:rPr lang="en-GB" sz="800" dirty="0">
+              <a:rPr lang="en-GB" sz="780" dirty="0">
                 <a:latin typeface="Courier New" panose="02070309020205020404" pitchFamily="49" charset="0"/>
                 <a:cs typeface="Courier New" panose="02070309020205020404" pitchFamily="49" charset="0"/>
               </a:rPr>
@@ -22951,63 +23153,63 @@
           </a:p>
           <a:p>
             <a:r>
-              <a:rPr lang="en-GB" sz="800" dirty="0">
+              <a:rPr lang="en-GB" sz="780" dirty="0">
                 <a:latin typeface="Courier New" panose="02070309020205020404" pitchFamily="49" charset="0"/>
                 <a:cs typeface="Courier New" panose="02070309020205020404" pitchFamily="49" charset="0"/>
               </a:rPr>
               <a:t>    </a:t>
             </a:r>
             <a:r>
-              <a:rPr lang="en-GB" sz="800" dirty="0" err="1">
+              <a:rPr lang="en-GB" sz="780" dirty="0" err="1">
                 <a:latin typeface="Courier New" panose="02070309020205020404" pitchFamily="49" charset="0"/>
                 <a:cs typeface="Courier New" panose="02070309020205020404" pitchFamily="49" charset="0"/>
               </a:rPr>
               <a:t>expectedCertificateSubject</a:t>
             </a:r>
             <a:r>
-              <a:rPr lang="en-GB" sz="800" dirty="0">
+              <a:rPr lang="en-GB" sz="780" dirty="0">
                 <a:latin typeface="Courier New" panose="02070309020205020404" pitchFamily="49" charset="0"/>
                 <a:cs typeface="Courier New" panose="02070309020205020404" pitchFamily="49" charset="0"/>
               </a:rPr>
               <a:t> = "CN=Float </a:t>
             </a:r>
             <a:r>
-              <a:rPr lang="en-GB" sz="800" dirty="0" err="1">
+              <a:rPr lang="en-GB" sz="780" dirty="0" err="1">
                 <a:latin typeface="Courier New" panose="02070309020205020404" pitchFamily="49" charset="0"/>
                 <a:cs typeface="Courier New" panose="02070309020205020404" pitchFamily="49" charset="0"/>
               </a:rPr>
               <a:t>Local,O</a:t>
             </a:r>
             <a:r>
-              <a:rPr lang="en-GB" sz="800" dirty="0">
+              <a:rPr lang="en-GB" sz="780" dirty="0">
                 <a:latin typeface="Courier New" panose="02070309020205020404" pitchFamily="49" charset="0"/>
                 <a:cs typeface="Courier New" panose="02070309020205020404" pitchFamily="49" charset="0"/>
               </a:rPr>
               <a:t>=</a:t>
             </a:r>
             <a:r>
-              <a:rPr lang="en-GB" sz="800" dirty="0" err="1">
+              <a:rPr lang="en-GB" sz="780" dirty="0" err="1">
                 <a:latin typeface="Courier New" panose="02070309020205020404" pitchFamily="49" charset="0"/>
                 <a:cs typeface="Courier New" panose="02070309020205020404" pitchFamily="49" charset="0"/>
               </a:rPr>
               <a:t>Tunnel,L</a:t>
             </a:r>
             <a:r>
-              <a:rPr lang="en-GB" sz="800" dirty="0">
+              <a:rPr lang="en-GB" sz="780" dirty="0">
                 <a:latin typeface="Courier New" panose="02070309020205020404" pitchFamily="49" charset="0"/>
                 <a:cs typeface="Courier New" panose="02070309020205020404" pitchFamily="49" charset="0"/>
               </a:rPr>
               <a:t>=</a:t>
             </a:r>
             <a:r>
-              <a:rPr lang="en-GB" sz="800" dirty="0" err="1">
+              <a:rPr lang="en-GB" sz="780" dirty="0" err="1">
                 <a:latin typeface="Courier New" panose="02070309020205020404" pitchFamily="49" charset="0"/>
                 <a:cs typeface="Courier New" panose="02070309020205020404" pitchFamily="49" charset="0"/>
               </a:rPr>
               <a:t>London,C</a:t>
             </a:r>
             <a:r>
-              <a:rPr lang="en-GB" sz="800" dirty="0">
+              <a:rPr lang="en-GB" sz="780" dirty="0">
                 <a:latin typeface="Courier New" panose="02070309020205020404" pitchFamily="49" charset="0"/>
                 <a:cs typeface="Courier New" panose="02070309020205020404" pitchFamily="49" charset="0"/>
               </a:rPr>
@@ -23016,21 +23218,21 @@
           </a:p>
           <a:p>
             <a:r>
-              <a:rPr lang="en-GB" sz="800" dirty="0">
+              <a:rPr lang="en-GB" sz="780" dirty="0">
                 <a:latin typeface="Courier New" panose="02070309020205020404" pitchFamily="49" charset="0"/>
                 <a:cs typeface="Courier New" panose="02070309020205020404" pitchFamily="49" charset="0"/>
               </a:rPr>
               <a:t>    </a:t>
             </a:r>
             <a:r>
-              <a:rPr lang="en-GB" sz="800" dirty="0" err="1">
+              <a:rPr lang="en-GB" sz="780" dirty="0" err="1">
                 <a:latin typeface="Courier New" panose="02070309020205020404" pitchFamily="49" charset="0"/>
                 <a:cs typeface="Courier New" panose="02070309020205020404" pitchFamily="49" charset="0"/>
               </a:rPr>
               <a:t>customSSLConfiguration</a:t>
             </a:r>
             <a:r>
-              <a:rPr lang="en-GB" sz="800" dirty="0">
+              <a:rPr lang="en-GB" sz="780" dirty="0">
                 <a:latin typeface="Courier New" panose="02070309020205020404" pitchFamily="49" charset="0"/>
                 <a:cs typeface="Courier New" panose="02070309020205020404" pitchFamily="49" charset="0"/>
               </a:rPr>
@@ -23039,35 +23241,35 @@
           </a:p>
           <a:p>
             <a:r>
-              <a:rPr lang="en-GB" sz="800" dirty="0">
+              <a:rPr lang="en-GB" sz="780" dirty="0">
                 <a:latin typeface="Courier New" panose="02070309020205020404" pitchFamily="49" charset="0"/>
                 <a:cs typeface="Courier New" panose="02070309020205020404" pitchFamily="49" charset="0"/>
               </a:rPr>
               <a:t>           </a:t>
             </a:r>
             <a:r>
-              <a:rPr lang="en-GB" sz="800" dirty="0" err="1">
+              <a:rPr lang="en-GB" sz="780" dirty="0" err="1">
                 <a:latin typeface="Courier New" panose="02070309020205020404" pitchFamily="49" charset="0"/>
                 <a:cs typeface="Courier New" panose="02070309020205020404" pitchFamily="49" charset="0"/>
               </a:rPr>
               <a:t>keyStorePassword</a:t>
             </a:r>
             <a:r>
-              <a:rPr lang="en-GB" sz="800" dirty="0">
+              <a:rPr lang="en-GB" sz="780" dirty="0">
                 <a:latin typeface="Courier New" panose="02070309020205020404" pitchFamily="49" charset="0"/>
                 <a:cs typeface="Courier New" panose="02070309020205020404" pitchFamily="49" charset="0"/>
               </a:rPr>
               <a:t> = "</a:t>
             </a:r>
             <a:r>
-              <a:rPr lang="en-GB" sz="800" dirty="0" err="1">
+              <a:rPr lang="en-GB" sz="780" dirty="0" err="1">
                 <a:latin typeface="Courier New" panose="02070309020205020404" pitchFamily="49" charset="0"/>
                 <a:cs typeface="Courier New" panose="02070309020205020404" pitchFamily="49" charset="0"/>
               </a:rPr>
               <a:t>bridgepass</a:t>
             </a:r>
             <a:r>
-              <a:rPr lang="en-GB" sz="800" dirty="0">
+              <a:rPr lang="en-GB" sz="780" dirty="0">
                 <a:latin typeface="Courier New" panose="02070309020205020404" pitchFamily="49" charset="0"/>
                 <a:cs typeface="Courier New" panose="02070309020205020404" pitchFamily="49" charset="0"/>
               </a:rPr>
@@ -23076,35 +23278,35 @@
           </a:p>
           <a:p>
             <a:r>
-              <a:rPr lang="en-GB" sz="800" dirty="0">
+              <a:rPr lang="en-GB" sz="780" dirty="0">
                 <a:latin typeface="Courier New" panose="02070309020205020404" pitchFamily="49" charset="0"/>
                 <a:cs typeface="Courier New" panose="02070309020205020404" pitchFamily="49" charset="0"/>
               </a:rPr>
               <a:t>           </a:t>
             </a:r>
             <a:r>
-              <a:rPr lang="en-GB" sz="800" dirty="0" err="1">
+              <a:rPr lang="en-GB" sz="780" dirty="0" err="1">
                 <a:latin typeface="Courier New" panose="02070309020205020404" pitchFamily="49" charset="0"/>
                 <a:cs typeface="Courier New" panose="02070309020205020404" pitchFamily="49" charset="0"/>
               </a:rPr>
               <a:t>trustStorePassword</a:t>
             </a:r>
             <a:r>
-              <a:rPr lang="en-GB" sz="800" dirty="0">
+              <a:rPr lang="en-GB" sz="780" dirty="0">
                 <a:latin typeface="Courier New" panose="02070309020205020404" pitchFamily="49" charset="0"/>
                 <a:cs typeface="Courier New" panose="02070309020205020404" pitchFamily="49" charset="0"/>
               </a:rPr>
               <a:t> = "</a:t>
             </a:r>
             <a:r>
-              <a:rPr lang="en-GB" sz="800" dirty="0" err="1">
+              <a:rPr lang="en-GB" sz="780" dirty="0" err="1">
                 <a:latin typeface="Courier New" panose="02070309020205020404" pitchFamily="49" charset="0"/>
                 <a:cs typeface="Courier New" panose="02070309020205020404" pitchFamily="49" charset="0"/>
               </a:rPr>
               <a:t>trustpass</a:t>
             </a:r>
             <a:r>
-              <a:rPr lang="en-GB" sz="800" dirty="0">
+              <a:rPr lang="en-GB" sz="780" dirty="0">
                 <a:latin typeface="Courier New" panose="02070309020205020404" pitchFamily="49" charset="0"/>
                 <a:cs typeface="Courier New" panose="02070309020205020404" pitchFamily="49" charset="0"/>
               </a:rPr>
@@ -23113,49 +23315,49 @@
           </a:p>
           <a:p>
             <a:r>
-              <a:rPr lang="en-GB" sz="800" dirty="0">
+              <a:rPr lang="en-GB" sz="780" dirty="0">
                 <a:latin typeface="Courier New" panose="02070309020205020404" pitchFamily="49" charset="0"/>
                 <a:cs typeface="Courier New" panose="02070309020205020404" pitchFamily="49" charset="0"/>
               </a:rPr>
               <a:t>           </a:t>
             </a:r>
             <a:r>
-              <a:rPr lang="en-GB" sz="800" dirty="0" err="1">
+              <a:rPr lang="en-GB" sz="780" dirty="0" err="1">
                 <a:latin typeface="Courier New" panose="02070309020205020404" pitchFamily="49" charset="0"/>
                 <a:cs typeface="Courier New" panose="02070309020205020404" pitchFamily="49" charset="0"/>
               </a:rPr>
               <a:t>sslKeystore</a:t>
             </a:r>
             <a:r>
-              <a:rPr lang="en-GB" sz="800" dirty="0">
+              <a:rPr lang="en-GB" sz="780" dirty="0">
                 <a:latin typeface="Courier New" panose="02070309020205020404" pitchFamily="49" charset="0"/>
                 <a:cs typeface="Courier New" panose="02070309020205020404" pitchFamily="49" charset="0"/>
               </a:rPr>
               <a:t> = "./</a:t>
             </a:r>
             <a:r>
-              <a:rPr lang="en-GB" sz="800" dirty="0" err="1">
+              <a:rPr lang="en-GB" sz="780" dirty="0" err="1">
                 <a:latin typeface="Courier New" panose="02070309020205020404" pitchFamily="49" charset="0"/>
                 <a:cs typeface="Courier New" panose="02070309020205020404" pitchFamily="49" charset="0"/>
               </a:rPr>
               <a:t>bridgecerts</a:t>
             </a:r>
             <a:r>
-              <a:rPr lang="en-GB" sz="800" dirty="0">
+              <a:rPr lang="en-GB" sz="780" dirty="0">
                 <a:latin typeface="Courier New" panose="02070309020205020404" pitchFamily="49" charset="0"/>
                 <a:cs typeface="Courier New" panose="02070309020205020404" pitchFamily="49" charset="0"/>
               </a:rPr>
               <a:t>/</a:t>
             </a:r>
             <a:r>
-              <a:rPr lang="en-GB" sz="800" dirty="0" err="1">
+              <a:rPr lang="en-GB" sz="780" dirty="0" err="1">
                 <a:latin typeface="Courier New" panose="02070309020205020404" pitchFamily="49" charset="0"/>
                 <a:cs typeface="Courier New" panose="02070309020205020404" pitchFamily="49" charset="0"/>
               </a:rPr>
               <a:t>bridge.jks</a:t>
             </a:r>
             <a:r>
-              <a:rPr lang="en-GB" sz="800" dirty="0">
+              <a:rPr lang="en-GB" sz="780" dirty="0">
                 <a:latin typeface="Courier New" panose="02070309020205020404" pitchFamily="49" charset="0"/>
                 <a:cs typeface="Courier New" panose="02070309020205020404" pitchFamily="49" charset="0"/>
               </a:rPr>
@@ -23164,58 +23366,81 @@
           </a:p>
           <a:p>
             <a:r>
-              <a:rPr lang="en-GB" sz="800" dirty="0">
+              <a:rPr lang="en-GB" sz="780" dirty="0">
                 <a:latin typeface="Courier New" panose="02070309020205020404" pitchFamily="49" charset="0"/>
                 <a:cs typeface="Courier New" panose="02070309020205020404" pitchFamily="49" charset="0"/>
               </a:rPr>
               <a:t>           </a:t>
             </a:r>
             <a:r>
-              <a:rPr lang="en-GB" sz="800" dirty="0" err="1">
+              <a:rPr lang="en-GB" sz="780" dirty="0" err="1">
                 <a:latin typeface="Courier New" panose="02070309020205020404" pitchFamily="49" charset="0"/>
                 <a:cs typeface="Courier New" panose="02070309020205020404" pitchFamily="49" charset="0"/>
               </a:rPr>
               <a:t>trustStoreFile</a:t>
             </a:r>
             <a:r>
-              <a:rPr lang="en-GB" sz="800" dirty="0">
+              <a:rPr lang="en-GB" sz="780" dirty="0">
                 <a:latin typeface="Courier New" panose="02070309020205020404" pitchFamily="49" charset="0"/>
                 <a:cs typeface="Courier New" panose="02070309020205020404" pitchFamily="49" charset="0"/>
               </a:rPr>
               <a:t> = "./</a:t>
             </a:r>
             <a:r>
-              <a:rPr lang="en-GB" sz="800" dirty="0" err="1">
+              <a:rPr lang="en-GB" sz="780" dirty="0" err="1">
                 <a:latin typeface="Courier New" panose="02070309020205020404" pitchFamily="49" charset="0"/>
                 <a:cs typeface="Courier New" panose="02070309020205020404" pitchFamily="49" charset="0"/>
               </a:rPr>
               <a:t>bridgecerts</a:t>
             </a:r>
             <a:r>
-              <a:rPr lang="en-GB" sz="800" dirty="0">
+              <a:rPr lang="en-GB" sz="780" dirty="0">
                 <a:latin typeface="Courier New" panose="02070309020205020404" pitchFamily="49" charset="0"/>
                 <a:cs typeface="Courier New" panose="02070309020205020404" pitchFamily="49" charset="0"/>
               </a:rPr>
               <a:t>/</a:t>
             </a:r>
             <a:r>
-              <a:rPr lang="en-GB" sz="800" dirty="0" err="1">
+              <a:rPr lang="en-GB" sz="780" dirty="0" err="1">
                 <a:latin typeface="Courier New" panose="02070309020205020404" pitchFamily="49" charset="0"/>
                 <a:cs typeface="Courier New" panose="02070309020205020404" pitchFamily="49" charset="0"/>
               </a:rPr>
               <a:t>trust.jks</a:t>
             </a:r>
             <a:r>
-              <a:rPr lang="en-GB" sz="800" dirty="0">
-                <a:latin typeface="Courier New" panose="02070309020205020404" pitchFamily="49" charset="0"/>
-                <a:cs typeface="Courier New" panose="02070309020205020404" pitchFamily="49" charset="0"/>
-              </a:rPr>
-              <a:t>"</a:t>
-            </a:r>
-          </a:p>
-          <a:p>
-            <a:r>
-              <a:rPr lang="en-GB" sz="800" dirty="0">
+              <a:rPr lang="en-GB" sz="780" dirty="0">
+                <a:latin typeface="Courier New" panose="02070309020205020404" pitchFamily="49" charset="0"/>
+                <a:cs typeface="Courier New" panose="02070309020205020404" pitchFamily="49" charset="0"/>
+              </a:rPr>
+              <a:t>“</a:t>
+            </a:r>
+          </a:p>
+          <a:p>
+            <a:r>
+              <a:rPr lang="en-GB" sz="780" dirty="0">
+                <a:latin typeface="Courier New" panose="02070309020205020404" pitchFamily="49" charset="0"/>
+                <a:cs typeface="Courier New" panose="02070309020205020404" pitchFamily="49" charset="0"/>
+              </a:rPr>
+              <a:t>           </a:t>
+            </a:r>
+            <a:r>
+              <a:rPr lang="en-GB" sz="780" dirty="0" err="1">
+                <a:latin typeface="Courier New" panose="02070309020205020404" pitchFamily="49" charset="0"/>
+                <a:cs typeface="Courier New" panose="02070309020205020404" pitchFamily="49" charset="0"/>
+              </a:rPr>
+              <a:t>crlCheckSoftFail</a:t>
+            </a:r>
+            <a:r>
+              <a:rPr lang="en-GB" sz="780" dirty="0">
+                <a:latin typeface="Courier New" panose="02070309020205020404" pitchFamily="49" charset="0"/>
+                <a:cs typeface="Courier New" panose="02070309020205020404" pitchFamily="49" charset="0"/>
+              </a:rPr>
+              <a:t> = true</a:t>
+            </a:r>
+          </a:p>
+          <a:p>
+            <a:r>
+              <a:rPr lang="en-GB" sz="780" dirty="0">
                 <a:latin typeface="Courier New" panose="02070309020205020404" pitchFamily="49" charset="0"/>
                 <a:cs typeface="Courier New" panose="02070309020205020404" pitchFamily="49" charset="0"/>
               </a:rPr>
@@ -23224,7 +23449,7 @@
           </a:p>
           <a:p>
             <a:r>
-              <a:rPr lang="en-GB" sz="800" dirty="0">
+              <a:rPr lang="en-GB" sz="780" dirty="0">
                 <a:latin typeface="Courier New" panose="02070309020205020404" pitchFamily="49" charset="0"/>
                 <a:cs typeface="Courier New" panose="02070309020205020404" pitchFamily="49" charset="0"/>
               </a:rPr>
@@ -23233,14 +23458,14 @@
           </a:p>
           <a:p>
             <a:r>
-              <a:rPr lang="en-GB" sz="800" dirty="0" err="1">
+              <a:rPr lang="en-GB" sz="780" dirty="0" err="1">
                 <a:latin typeface="Courier New" panose="02070309020205020404" pitchFamily="49" charset="0"/>
                 <a:cs typeface="Courier New" panose="02070309020205020404" pitchFamily="49" charset="0"/>
               </a:rPr>
               <a:t>haConfig</a:t>
             </a:r>
             <a:r>
-              <a:rPr lang="en-GB" sz="800" dirty="0">
+              <a:rPr lang="en-GB" sz="780" dirty="0">
                 <a:latin typeface="Courier New" panose="02070309020205020404" pitchFamily="49" charset="0"/>
                 <a:cs typeface="Courier New" panose="02070309020205020404" pitchFamily="49" charset="0"/>
               </a:rPr>
@@ -23249,14 +23474,14 @@
           </a:p>
           <a:p>
             <a:r>
-              <a:rPr lang="en-GB" sz="800" dirty="0">
+              <a:rPr lang="en-GB" sz="780" dirty="0">
                 <a:latin typeface="Courier New" panose="02070309020205020404" pitchFamily="49" charset="0"/>
                 <a:cs typeface="Courier New" panose="02070309020205020404" pitchFamily="49" charset="0"/>
               </a:rPr>
               <a:t>    </a:t>
             </a:r>
             <a:r>
-              <a:rPr lang="en-GB" sz="800" dirty="0" err="1">
+              <a:rPr lang="en-GB" sz="780" dirty="0" err="1">
                 <a:solidFill>
                   <a:srgbClr val="FF0000"/>
                 </a:solidFill>
@@ -23266,7 +23491,7 @@
               <a:t>haConnectionString</a:t>
             </a:r>
             <a:r>
-              <a:rPr lang="en-GB" sz="800" dirty="0">
+              <a:rPr lang="en-GB" sz="780" dirty="0">
                 <a:solidFill>
                   <a:srgbClr val="FF0000"/>
                 </a:solidFill>
@@ -23276,7 +23501,7 @@
               <a:t> = "</a:t>
             </a:r>
             <a:r>
-              <a:rPr lang="en-GB" sz="800" dirty="0" err="1">
+              <a:rPr lang="en-GB" sz="780" dirty="0" err="1">
                 <a:solidFill>
                   <a:srgbClr val="FF0000"/>
                 </a:solidFill>
@@ -23286,7 +23511,7 @@
               <a:t>zk</a:t>
             </a:r>
             <a:r>
-              <a:rPr lang="en-GB" sz="800" dirty="0">
+              <a:rPr lang="en-GB" sz="780" dirty="0">
                 <a:solidFill>
                   <a:srgbClr val="FF0000"/>
                 </a:solidFill>
@@ -23296,7 +23521,7 @@
               <a:t>://zookeep1:11105,zk://zookeep2:11105 ,</a:t>
             </a:r>
             <a:r>
-              <a:rPr lang="en-GB" sz="800" dirty="0" err="1">
+              <a:rPr lang="en-GB" sz="780" dirty="0" err="1">
                 <a:solidFill>
                   <a:srgbClr val="FF0000"/>
                 </a:solidFill>
@@ -23306,7 +23531,7 @@
               <a:t>zk</a:t>
             </a:r>
             <a:r>
-              <a:rPr lang="en-GB" sz="800" dirty="0">
+              <a:rPr lang="en-GB" sz="780" dirty="0">
                 <a:solidFill>
                   <a:srgbClr val="FF0000"/>
                 </a:solidFill>
@@ -23318,7 +23543,7 @@
           </a:p>
           <a:p>
             <a:r>
-              <a:rPr lang="en-GB" sz="800" dirty="0">
+              <a:rPr lang="en-GB" sz="780" dirty="0">
                 <a:latin typeface="Courier New" panose="02070309020205020404" pitchFamily="49" charset="0"/>
                 <a:cs typeface="Courier New" panose="02070309020205020404" pitchFamily="49" charset="0"/>
               </a:rPr>
@@ -23327,14 +23552,14 @@
           </a:p>
           <a:p>
             <a:r>
-              <a:rPr lang="en-GB" sz="800" dirty="0" err="1">
+              <a:rPr lang="en-GB" sz="780" dirty="0" err="1">
                 <a:latin typeface="Courier New" panose="02070309020205020404" pitchFamily="49" charset="0"/>
                 <a:cs typeface="Courier New" panose="02070309020205020404" pitchFamily="49" charset="0"/>
               </a:rPr>
               <a:t>networkParametersPath</a:t>
             </a:r>
             <a:r>
-              <a:rPr lang="en-GB" sz="800" dirty="0">
+              <a:rPr lang="en-GB" sz="780" dirty="0">
                 <a:latin typeface="Courier New" panose="02070309020205020404" pitchFamily="49" charset="0"/>
                 <a:cs typeface="Courier New" panose="02070309020205020404" pitchFamily="49" charset="0"/>
               </a:rPr>
@@ -24623,8 +24848,8 @@
         </p:nvSpPr>
         <p:spPr>
           <a:xfrm>
-            <a:off x="7790603" y="4470798"/>
-            <a:ext cx="4306648" cy="2308324"/>
+            <a:off x="7767368" y="4374326"/>
+            <a:ext cx="4306648" cy="2431435"/>
           </a:xfrm>
           <a:prstGeom prst="rect">
             <a:avLst/>
@@ -25053,7 +25278,30 @@
                 <a:latin typeface="Courier New" panose="02070309020205020404" pitchFamily="49" charset="0"/>
                 <a:cs typeface="Courier New" panose="02070309020205020404" pitchFamily="49" charset="0"/>
               </a:rPr>
-              <a:t>"</a:t>
+              <a:t>“</a:t>
+            </a:r>
+          </a:p>
+          <a:p>
+            <a:r>
+              <a:rPr lang="en-GB" sz="800" dirty="0">
+                <a:latin typeface="Courier New" panose="02070309020205020404" pitchFamily="49" charset="0"/>
+                <a:cs typeface="Courier New" panose="02070309020205020404" pitchFamily="49" charset="0"/>
+              </a:rPr>
+              <a:t>           </a:t>
+            </a:r>
+            <a:r>
+              <a:rPr lang="en-GB" sz="800" dirty="0" err="1">
+                <a:latin typeface="Courier New" panose="02070309020205020404" pitchFamily="49" charset="0"/>
+                <a:cs typeface="Courier New" panose="02070309020205020404" pitchFamily="49" charset="0"/>
+              </a:rPr>
+              <a:t>crlCheckSoftFail</a:t>
+            </a:r>
+            <a:r>
+              <a:rPr lang="en-GB" sz="800" dirty="0">
+                <a:latin typeface="Courier New" panose="02070309020205020404" pitchFamily="49" charset="0"/>
+                <a:cs typeface="Courier New" panose="02070309020205020404" pitchFamily="49" charset="0"/>
+              </a:rPr>
+              <a:t> = true</a:t>
             </a:r>
           </a:p>
           <a:p>
@@ -26645,7 +26893,7 @@
         <p:spPr>
           <a:xfrm>
             <a:off x="3080592" y="4004381"/>
-            <a:ext cx="4513130" cy="2646878"/>
+            <a:ext cx="4513130" cy="2739211"/>
           </a:xfrm>
           <a:prstGeom prst="rect">
             <a:avLst/>
@@ -27176,7 +27424,30 @@
                 <a:latin typeface="Courier New" panose="02070309020205020404" pitchFamily="49" charset="0"/>
                 <a:cs typeface="Courier New" panose="02070309020205020404" pitchFamily="49" charset="0"/>
               </a:rPr>
-              <a:t>"</a:t>
+              <a:t>“</a:t>
+            </a:r>
+          </a:p>
+          <a:p>
+            <a:r>
+              <a:rPr lang="en-GB" sz="600" dirty="0">
+                <a:latin typeface="Courier New" panose="02070309020205020404" pitchFamily="49" charset="0"/>
+                <a:cs typeface="Courier New" panose="02070309020205020404" pitchFamily="49" charset="0"/>
+              </a:rPr>
+              <a:t>           </a:t>
+            </a:r>
+            <a:r>
+              <a:rPr lang="en-GB" sz="600" dirty="0" err="1">
+                <a:latin typeface="Courier New" panose="02070309020205020404" pitchFamily="49" charset="0"/>
+                <a:cs typeface="Courier New" panose="02070309020205020404" pitchFamily="49" charset="0"/>
+              </a:rPr>
+              <a:t>crlCheckSoftFail</a:t>
+            </a:r>
+            <a:r>
+              <a:rPr lang="en-GB" sz="600" dirty="0">
+                <a:latin typeface="Courier New" panose="02070309020205020404" pitchFamily="49" charset="0"/>
+                <a:cs typeface="Courier New" panose="02070309020205020404" pitchFamily="49" charset="0"/>
+              </a:rPr>
+              <a:t> = true</a:t>
             </a:r>
           </a:p>
           <a:p>
@@ -27308,8 +27579,8 @@
         </p:nvCxnSpPr>
         <p:spPr>
           <a:xfrm flipH="1">
-            <a:off x="7185618" y="3666280"/>
-            <a:ext cx="500659" cy="419690"/>
+            <a:off x="7245399" y="3666280"/>
+            <a:ext cx="440878" cy="351259"/>
           </a:xfrm>
           <a:prstGeom prst="straightConnector1">
             <a:avLst/>
@@ -27355,7 +27626,7 @@
         <p:spPr>
           <a:xfrm flipH="1">
             <a:off x="9433322" y="3666280"/>
-            <a:ext cx="1" cy="804518"/>
+            <a:ext cx="1" cy="702519"/>
           </a:xfrm>
           <a:prstGeom prst="straightConnector1">
             <a:avLst/>
@@ -28498,8 +28769,8 @@
         </p:nvSpPr>
         <p:spPr>
           <a:xfrm>
-            <a:off x="7790603" y="4470798"/>
-            <a:ext cx="4306648" cy="2308324"/>
+            <a:off x="7741297" y="4368799"/>
+            <a:ext cx="4306648" cy="2431435"/>
           </a:xfrm>
           <a:prstGeom prst="rect">
             <a:avLst/>
@@ -28928,7 +29199,30 @@
                 <a:latin typeface="Courier New" panose="02070309020205020404" pitchFamily="49" charset="0"/>
                 <a:cs typeface="Courier New" panose="02070309020205020404" pitchFamily="49" charset="0"/>
               </a:rPr>
-              <a:t>"</a:t>
+              <a:t>“</a:t>
+            </a:r>
+          </a:p>
+          <a:p>
+            <a:r>
+              <a:rPr lang="en-GB" sz="800" dirty="0">
+                <a:latin typeface="Courier New" panose="02070309020205020404" pitchFamily="49" charset="0"/>
+                <a:cs typeface="Courier New" panose="02070309020205020404" pitchFamily="49" charset="0"/>
+              </a:rPr>
+              <a:t>           </a:t>
+            </a:r>
+            <a:r>
+              <a:rPr lang="en-GB" sz="800" dirty="0" err="1">
+                <a:latin typeface="Courier New" panose="02070309020205020404" pitchFamily="49" charset="0"/>
+                <a:cs typeface="Courier New" panose="02070309020205020404" pitchFamily="49" charset="0"/>
+              </a:rPr>
+              <a:t>crlCheckSoftFail</a:t>
+            </a:r>
+            <a:r>
+              <a:rPr lang="en-GB" sz="800" dirty="0">
+                <a:latin typeface="Courier New" panose="02070309020205020404" pitchFamily="49" charset="0"/>
+                <a:cs typeface="Courier New" panose="02070309020205020404" pitchFamily="49" charset="0"/>
+              </a:rPr>
+              <a:t> = true</a:t>
             </a:r>
           </a:p>
           <a:p>

</xml_diff>

<commit_message>
ENT-1959: add a default value for mutualExclusionConfiguration.machineName (#877)
* ENT-1959: add a default value for mutualExclusionConfiguration.machineName

* ENT-1959: update docs

* ENT-1959: update docs, remove machineName from default conf, add unit test
</commit_message>
<xml_diff>
--- a/docs/source/design/float/deployment/Bridge Configurations.pptx
+++ b/docs/source/design/float/deployment/Bridge Configurations.pptx
@@ -207,7 +207,7 @@
           <a:p>
             <a:fld id="{2C82E4B6-2456-4935-B807-26B7F91AC855}" type="datetimeFigureOut">
               <a:rPr lang="en-GB" smtClean="0"/>
-              <a:t>17/05/2018</a:t>
+              <a:t>24/05/2018</a:t>
             </a:fld>
             <a:endParaRPr lang="en-GB"/>
           </a:p>
@@ -708,7 +708,7 @@
           <a:p>
             <a:fld id="{72A4DE50-58D0-4AE8-8BAA-5262A4FF172B}" type="datetimeFigureOut">
               <a:rPr lang="en-GB" smtClean="0"/>
-              <a:t>17/05/2018</a:t>
+              <a:t>24/05/2018</a:t>
             </a:fld>
             <a:endParaRPr lang="en-GB"/>
           </a:p>
@@ -908,7 +908,7 @@
           <a:p>
             <a:fld id="{72A4DE50-58D0-4AE8-8BAA-5262A4FF172B}" type="datetimeFigureOut">
               <a:rPr lang="en-GB" smtClean="0"/>
-              <a:t>17/05/2018</a:t>
+              <a:t>24/05/2018</a:t>
             </a:fld>
             <a:endParaRPr lang="en-GB"/>
           </a:p>
@@ -1118,7 +1118,7 @@
           <a:p>
             <a:fld id="{72A4DE50-58D0-4AE8-8BAA-5262A4FF172B}" type="datetimeFigureOut">
               <a:rPr lang="en-GB" smtClean="0"/>
-              <a:t>17/05/2018</a:t>
+              <a:t>24/05/2018</a:t>
             </a:fld>
             <a:endParaRPr lang="en-GB"/>
           </a:p>
@@ -1318,7 +1318,7 @@
           <a:p>
             <a:fld id="{72A4DE50-58D0-4AE8-8BAA-5262A4FF172B}" type="datetimeFigureOut">
               <a:rPr lang="en-GB" smtClean="0"/>
-              <a:t>17/05/2018</a:t>
+              <a:t>24/05/2018</a:t>
             </a:fld>
             <a:endParaRPr lang="en-GB"/>
           </a:p>
@@ -1594,7 +1594,7 @@
           <a:p>
             <a:fld id="{72A4DE50-58D0-4AE8-8BAA-5262A4FF172B}" type="datetimeFigureOut">
               <a:rPr lang="en-GB" smtClean="0"/>
-              <a:t>17/05/2018</a:t>
+              <a:t>24/05/2018</a:t>
             </a:fld>
             <a:endParaRPr lang="en-GB"/>
           </a:p>
@@ -1862,7 +1862,7 @@
           <a:p>
             <a:fld id="{72A4DE50-58D0-4AE8-8BAA-5262A4FF172B}" type="datetimeFigureOut">
               <a:rPr lang="en-GB" smtClean="0"/>
-              <a:t>17/05/2018</a:t>
+              <a:t>24/05/2018</a:t>
             </a:fld>
             <a:endParaRPr lang="en-GB"/>
           </a:p>
@@ -2277,7 +2277,7 @@
           <a:p>
             <a:fld id="{72A4DE50-58D0-4AE8-8BAA-5262A4FF172B}" type="datetimeFigureOut">
               <a:rPr lang="en-GB" smtClean="0"/>
-              <a:t>17/05/2018</a:t>
+              <a:t>24/05/2018</a:t>
             </a:fld>
             <a:endParaRPr lang="en-GB"/>
           </a:p>
@@ -2419,7 +2419,7 @@
           <a:p>
             <a:fld id="{72A4DE50-58D0-4AE8-8BAA-5262A4FF172B}" type="datetimeFigureOut">
               <a:rPr lang="en-GB" smtClean="0"/>
-              <a:t>17/05/2018</a:t>
+              <a:t>24/05/2018</a:t>
             </a:fld>
             <a:endParaRPr lang="en-GB"/>
           </a:p>
@@ -2532,7 +2532,7 @@
           <a:p>
             <a:fld id="{72A4DE50-58D0-4AE8-8BAA-5262A4FF172B}" type="datetimeFigureOut">
               <a:rPr lang="en-GB" smtClean="0"/>
-              <a:t>17/05/2018</a:t>
+              <a:t>24/05/2018</a:t>
             </a:fld>
             <a:endParaRPr lang="en-GB"/>
           </a:p>
@@ -2845,7 +2845,7 @@
           <a:p>
             <a:fld id="{72A4DE50-58D0-4AE8-8BAA-5262A4FF172B}" type="datetimeFigureOut">
               <a:rPr lang="en-GB" smtClean="0"/>
-              <a:t>17/05/2018</a:t>
+              <a:t>24/05/2018</a:t>
             </a:fld>
             <a:endParaRPr lang="en-GB"/>
           </a:p>
@@ -3134,7 +3134,7 @@
           <a:p>
             <a:fld id="{72A4DE50-58D0-4AE8-8BAA-5262A4FF172B}" type="datetimeFigureOut">
               <a:rPr lang="en-GB" smtClean="0"/>
-              <a:t>17/05/2018</a:t>
+              <a:t>24/05/2018</a:t>
             </a:fld>
             <a:endParaRPr lang="en-GB"/>
           </a:p>
@@ -3377,7 +3377,7 @@
           <a:p>
             <a:fld id="{72A4DE50-58D0-4AE8-8BAA-5262A4FF172B}" type="datetimeFigureOut">
               <a:rPr lang="en-GB" smtClean="0"/>
-              <a:t>17/05/2018</a:t>
+              <a:t>24/05/2018</a:t>
             </a:fld>
             <a:endParaRPr lang="en-GB"/>
           </a:p>
@@ -23678,7 +23678,7 @@
         <p:spPr>
           <a:xfrm rot="10800000" flipV="1">
             <a:off x="1533805" y="3446321"/>
-            <a:ext cx="1500117" cy="435529"/>
+            <a:ext cx="1500119" cy="435530"/>
           </a:xfrm>
           <a:prstGeom prst="bentConnector2">
             <a:avLst/>
@@ -23805,7 +23805,7 @@
         <p:spPr>
           <a:xfrm>
             <a:off x="19607" y="3881851"/>
-            <a:ext cx="3028393" cy="2939266"/>
+            <a:ext cx="3028393" cy="2816156"/>
           </a:xfrm>
           <a:prstGeom prst="rect">
             <a:avLst/>
@@ -24188,29 +24188,6 @@
                 <a:cs typeface="Courier New" panose="02070309020205020404" pitchFamily="49" charset="0"/>
               </a:rPr>
               <a:t>        on = true</a:t>
-            </a:r>
-          </a:p>
-          <a:p>
-            <a:r>
-              <a:rPr lang="en-GB" sz="800" dirty="0">
-                <a:latin typeface="Courier New" panose="02070309020205020404" pitchFamily="49" charset="0"/>
-                <a:cs typeface="Courier New" panose="02070309020205020404" pitchFamily="49" charset="0"/>
-              </a:rPr>
-              <a:t>        </a:t>
-            </a:r>
-            <a:r>
-              <a:rPr lang="en-GB" sz="800" dirty="0" err="1">
-                <a:latin typeface="Courier New" panose="02070309020205020404" pitchFamily="49" charset="0"/>
-                <a:cs typeface="Courier New" panose="02070309020205020404" pitchFamily="49" charset="0"/>
-              </a:rPr>
-              <a:t>machineName</a:t>
-            </a:r>
-            <a:r>
-              <a:rPr lang="en-GB" sz="800" dirty="0">
-                <a:latin typeface="Courier New" panose="02070309020205020404" pitchFamily="49" charset="0"/>
-                <a:cs typeface="Courier New" panose="02070309020205020404" pitchFamily="49" charset="0"/>
-              </a:rPr>
-              <a:t> = "nodeserver1"</a:t>
             </a:r>
           </a:p>
           <a:p>
@@ -27672,7 +27649,7 @@
         <p:spPr>
           <a:xfrm rot="10800000" flipV="1">
             <a:off x="1533805" y="3446321"/>
-            <a:ext cx="1500117" cy="435529"/>
+            <a:ext cx="1500119" cy="435530"/>
           </a:xfrm>
           <a:prstGeom prst="bentConnector2">
             <a:avLst/>
@@ -27799,7 +27776,7 @@
         <p:spPr>
           <a:xfrm>
             <a:off x="19607" y="3881851"/>
-            <a:ext cx="3028393" cy="2939266"/>
+            <a:ext cx="3028393" cy="2816156"/>
           </a:xfrm>
           <a:prstGeom prst="rect">
             <a:avLst/>
@@ -28162,41 +28139,11 @@
           </a:p>
           <a:p>
             <a:r>
-              <a:rPr lang="en-GB" sz="800" dirty="0">
-                <a:latin typeface="Courier New" panose="02070309020205020404" pitchFamily="49" charset="0"/>
-                <a:cs typeface="Courier New" panose="02070309020205020404" pitchFamily="49" charset="0"/>
-              </a:rPr>
-              <a:t>        </a:t>
-            </a:r>
-            <a:r>
-              <a:rPr lang="en-GB" sz="800" dirty="0" err="1">
-                <a:latin typeface="Courier New" panose="02070309020205020404" pitchFamily="49" charset="0"/>
-                <a:cs typeface="Courier New" panose="02070309020205020404" pitchFamily="49" charset="0"/>
-              </a:rPr>
-              <a:t>machineName</a:t>
-            </a:r>
-            <a:r>
-              <a:rPr lang="en-GB" sz="800" dirty="0">
-                <a:latin typeface="Courier New" panose="02070309020205020404" pitchFamily="49" charset="0"/>
-                <a:cs typeface="Courier New" panose="02070309020205020404" pitchFamily="49" charset="0"/>
-              </a:rPr>
-              <a:t> = "nodeserver1"</a:t>
-            </a:r>
-          </a:p>
-          <a:p>
-            <a:r>
-              <a:rPr lang="en-GB" sz="800" dirty="0">
-                <a:latin typeface="Courier New" panose="02070309020205020404" pitchFamily="49" charset="0"/>
-                <a:cs typeface="Courier New" panose="02070309020205020404" pitchFamily="49" charset="0"/>
-              </a:rPr>
-              <a:t>        </a:t>
-            </a:r>
-            <a:r>
-              <a:rPr lang="en-GB" sz="800" dirty="0" err="1">
-                <a:latin typeface="Courier New" panose="02070309020205020404" pitchFamily="49" charset="0"/>
-                <a:cs typeface="Courier New" panose="02070309020205020404" pitchFamily="49" charset="0"/>
-              </a:rPr>
-              <a:t>updateInterval</a:t>
+              <a:rPr lang="en-GB" sz="800">
+                <a:latin typeface="Courier New" panose="02070309020205020404" pitchFamily="49" charset="0"/>
+                <a:cs typeface="Courier New" panose="02070309020205020404" pitchFamily="49" charset="0"/>
+              </a:rPr>
+              <a:t>        updateInterval</a:t>
             </a:r>
             <a:r>
               <a:rPr lang="en-GB" sz="800" dirty="0">

</xml_diff>

<commit_message>
Bridge to Firewall renames
More renaming

Update diagrams

Update changelog to point out breaking change fo the rename

Address Richard's PR comments
</commit_message>
<xml_diff>
--- a/docs/source/design/float/deployment/Bridge Configurations.pptx
+++ b/docs/source/design/float/deployment/Bridge Configurations.pptx
@@ -207,7 +207,7 @@
           <a:p>
             <a:fld id="{2C82E4B6-2456-4935-B807-26B7F91AC855}" type="datetimeFigureOut">
               <a:rPr lang="en-GB" smtClean="0"/>
-              <a:t>24/05/2018</a:t>
+              <a:t>04/07/2018</a:t>
             </a:fld>
             <a:endParaRPr lang="en-GB"/>
           </a:p>
@@ -708,7 +708,7 @@
           <a:p>
             <a:fld id="{72A4DE50-58D0-4AE8-8BAA-5262A4FF172B}" type="datetimeFigureOut">
               <a:rPr lang="en-GB" smtClean="0"/>
-              <a:t>24/05/2018</a:t>
+              <a:t>04/07/2018</a:t>
             </a:fld>
             <a:endParaRPr lang="en-GB"/>
           </a:p>
@@ -908,7 +908,7 @@
           <a:p>
             <a:fld id="{72A4DE50-58D0-4AE8-8BAA-5262A4FF172B}" type="datetimeFigureOut">
               <a:rPr lang="en-GB" smtClean="0"/>
-              <a:t>24/05/2018</a:t>
+              <a:t>04/07/2018</a:t>
             </a:fld>
             <a:endParaRPr lang="en-GB"/>
           </a:p>
@@ -1118,7 +1118,7 @@
           <a:p>
             <a:fld id="{72A4DE50-58D0-4AE8-8BAA-5262A4FF172B}" type="datetimeFigureOut">
               <a:rPr lang="en-GB" smtClean="0"/>
-              <a:t>24/05/2018</a:t>
+              <a:t>04/07/2018</a:t>
             </a:fld>
             <a:endParaRPr lang="en-GB"/>
           </a:p>
@@ -1318,7 +1318,7 @@
           <a:p>
             <a:fld id="{72A4DE50-58D0-4AE8-8BAA-5262A4FF172B}" type="datetimeFigureOut">
               <a:rPr lang="en-GB" smtClean="0"/>
-              <a:t>24/05/2018</a:t>
+              <a:t>04/07/2018</a:t>
             </a:fld>
             <a:endParaRPr lang="en-GB"/>
           </a:p>
@@ -1594,7 +1594,7 @@
           <a:p>
             <a:fld id="{72A4DE50-58D0-4AE8-8BAA-5262A4FF172B}" type="datetimeFigureOut">
               <a:rPr lang="en-GB" smtClean="0"/>
-              <a:t>24/05/2018</a:t>
+              <a:t>04/07/2018</a:t>
             </a:fld>
             <a:endParaRPr lang="en-GB"/>
           </a:p>
@@ -1862,7 +1862,7 @@
           <a:p>
             <a:fld id="{72A4DE50-58D0-4AE8-8BAA-5262A4FF172B}" type="datetimeFigureOut">
               <a:rPr lang="en-GB" smtClean="0"/>
-              <a:t>24/05/2018</a:t>
+              <a:t>04/07/2018</a:t>
             </a:fld>
             <a:endParaRPr lang="en-GB"/>
           </a:p>
@@ -2277,7 +2277,7 @@
           <a:p>
             <a:fld id="{72A4DE50-58D0-4AE8-8BAA-5262A4FF172B}" type="datetimeFigureOut">
               <a:rPr lang="en-GB" smtClean="0"/>
-              <a:t>24/05/2018</a:t>
+              <a:t>04/07/2018</a:t>
             </a:fld>
             <a:endParaRPr lang="en-GB"/>
           </a:p>
@@ -2419,7 +2419,7 @@
           <a:p>
             <a:fld id="{72A4DE50-58D0-4AE8-8BAA-5262A4FF172B}" type="datetimeFigureOut">
               <a:rPr lang="en-GB" smtClean="0"/>
-              <a:t>24/05/2018</a:t>
+              <a:t>04/07/2018</a:t>
             </a:fld>
             <a:endParaRPr lang="en-GB"/>
           </a:p>
@@ -2532,7 +2532,7 @@
           <a:p>
             <a:fld id="{72A4DE50-58D0-4AE8-8BAA-5262A4FF172B}" type="datetimeFigureOut">
               <a:rPr lang="en-GB" smtClean="0"/>
-              <a:t>24/05/2018</a:t>
+              <a:t>04/07/2018</a:t>
             </a:fld>
             <a:endParaRPr lang="en-GB"/>
           </a:p>
@@ -2845,7 +2845,7 @@
           <a:p>
             <a:fld id="{72A4DE50-58D0-4AE8-8BAA-5262A4FF172B}" type="datetimeFigureOut">
               <a:rPr lang="en-GB" smtClean="0"/>
-              <a:t>24/05/2018</a:t>
+              <a:t>04/07/2018</a:t>
             </a:fld>
             <a:endParaRPr lang="en-GB"/>
           </a:p>
@@ -3134,7 +3134,7 @@
           <a:p>
             <a:fld id="{72A4DE50-58D0-4AE8-8BAA-5262A4FF172B}" type="datetimeFigureOut">
               <a:rPr lang="en-GB" smtClean="0"/>
-              <a:t>24/05/2018</a:t>
+              <a:t>04/07/2018</a:t>
             </a:fld>
             <a:endParaRPr lang="en-GB"/>
           </a:p>
@@ -3377,7 +3377,7 @@
           <a:p>
             <a:fld id="{72A4DE50-58D0-4AE8-8BAA-5262A4FF172B}" type="datetimeFigureOut">
               <a:rPr lang="en-GB" smtClean="0"/>
-              <a:t>24/05/2018</a:t>
+              <a:t>04/07/2018</a:t>
             </a:fld>
             <a:endParaRPr lang="en-GB"/>
           </a:p>
@@ -4042,8 +4042,8 @@
         </p:nvSpPr>
         <p:spPr>
           <a:xfrm>
-            <a:off x="3624009" y="0"/>
-            <a:ext cx="4943982" cy="400110"/>
+            <a:off x="3624009" y="4064"/>
+            <a:ext cx="4503156" cy="400110"/>
           </a:xfrm>
           <a:prstGeom prst="rect">
             <a:avLst/>
@@ -4062,7 +4062,7 @@
                 <a:latin typeface="Times New Roman" panose="02020603050405020304" pitchFamily="18" charset="0"/>
                 <a:cs typeface="Times New Roman" panose="02020603050405020304" pitchFamily="18" charset="0"/>
               </a:rPr>
-              <a:t>Simple Self-Contained Node, No Bridge/Float</a:t>
+              <a:t>Simple Self-Contained Node, No Firewall</a:t>
             </a:r>
           </a:p>
         </p:txBody>
@@ -6018,7 +6018,7 @@
                 <a:latin typeface="Times New Roman" panose="02020603050405020304" pitchFamily="18" charset="0"/>
                 <a:cs typeface="Times New Roman" panose="02020603050405020304" pitchFamily="18" charset="0"/>
               </a:rPr>
-              <a:t>Bridge</a:t>
+              <a:t>Firewall</a:t>
             </a:r>
           </a:p>
         </p:txBody>
@@ -6290,7 +6290,7 @@
         <p:spPr>
           <a:xfrm>
             <a:off x="3343484" y="0"/>
-            <a:ext cx="5505033" cy="400110"/>
+            <a:ext cx="5660524" cy="400110"/>
           </a:xfrm>
           <a:prstGeom prst="rect">
             <a:avLst/>
@@ -6309,7 +6309,7 @@
                 <a:latin typeface="Times New Roman" panose="02020603050405020304" pitchFamily="18" charset="0"/>
                 <a:cs typeface="Times New Roman" panose="02020603050405020304" pitchFamily="18" charset="0"/>
               </a:rPr>
-              <a:t>Simple Node, Single External Bridge Configuration</a:t>
+              <a:t>Simple Node, Single External Firewall Configuration</a:t>
             </a:r>
           </a:p>
         </p:txBody>
@@ -6836,7 +6836,7 @@
                 <a:latin typeface="Times New Roman" panose="02020603050405020304" pitchFamily="18" charset="0"/>
                 <a:cs typeface="Times New Roman" panose="02020603050405020304" pitchFamily="18" charset="0"/>
               </a:rPr>
-              <a:t>bridge.conf</a:t>
+              <a:t>firewall.conf</a:t>
             </a:r>
             <a:endParaRPr lang="en-GB" sz="1600" dirty="0">
               <a:latin typeface="Times New Roman" panose="02020603050405020304" pitchFamily="18" charset="0"/>
@@ -6852,7 +6852,7 @@
                 <a:latin typeface="Courier New" panose="02070309020205020404" pitchFamily="49" charset="0"/>
                 <a:cs typeface="Courier New" panose="02070309020205020404" pitchFamily="49" charset="0"/>
               </a:rPr>
-              <a:t>bridgeMode</a:t>
+              <a:t>firewallMode</a:t>
             </a:r>
             <a:r>
               <a:rPr lang="en-GB" sz="800" dirty="0">
@@ -7048,7 +7048,7 @@
                 <a:latin typeface="Times New Roman" panose="02020603050405020304" pitchFamily="18" charset="0"/>
                 <a:cs typeface="Times New Roman" panose="02020603050405020304" pitchFamily="18" charset="0"/>
               </a:rPr>
-              <a:t>Bridge Certs &amp; Keys:</a:t>
+              <a:t>Firewall Certs &amp; Keys:</a:t>
             </a:r>
           </a:p>
           <a:p>
@@ -9220,7 +9220,7 @@
                 <a:latin typeface="Times New Roman" panose="02020603050405020304" pitchFamily="18" charset="0"/>
                 <a:cs typeface="Times New Roman" panose="02020603050405020304" pitchFamily="18" charset="0"/>
               </a:rPr>
-              <a:t>bridge.conf</a:t>
+              <a:t>firewall.conf</a:t>
             </a:r>
             <a:endParaRPr lang="en-GB" sz="1600" dirty="0">
               <a:latin typeface="Times New Roman" panose="02020603050405020304" pitchFamily="18" charset="0"/>
@@ -9236,7 +9236,7 @@
                 <a:latin typeface="Courier New" panose="02070309020205020404" pitchFamily="49" charset="0"/>
                 <a:cs typeface="Courier New" panose="02070309020205020404" pitchFamily="49" charset="0"/>
               </a:rPr>
-              <a:t>bridgeMode</a:t>
+              <a:t>firewallMode</a:t>
             </a:r>
             <a:r>
               <a:rPr lang="en-GB" sz="800" dirty="0">
@@ -9922,7 +9922,7 @@
                 <a:latin typeface="Times New Roman" panose="02020603050405020304" pitchFamily="18" charset="0"/>
                 <a:cs typeface="Times New Roman" panose="02020603050405020304" pitchFamily="18" charset="0"/>
               </a:rPr>
-              <a:t>bridge.conf</a:t>
+              <a:t>firewall.conf</a:t>
             </a:r>
             <a:endParaRPr lang="en-GB" sz="1600" dirty="0">
               <a:latin typeface="Times New Roman" panose="02020603050405020304" pitchFamily="18" charset="0"/>
@@ -9938,7 +9938,7 @@
                 <a:latin typeface="Courier New" panose="02070309020205020404" pitchFamily="49" charset="0"/>
                 <a:cs typeface="Courier New" panose="02070309020205020404" pitchFamily="49" charset="0"/>
               </a:rPr>
-              <a:t>bridgeMode</a:t>
+              <a:t>firewallMode</a:t>
             </a:r>
             <a:r>
               <a:rPr lang="en-GB" sz="800" dirty="0">
@@ -12623,7 +12623,7 @@
                 <a:latin typeface="Times New Roman" panose="02020603050405020304" pitchFamily="18" charset="0"/>
                 <a:cs typeface="Times New Roman" panose="02020603050405020304" pitchFamily="18" charset="0"/>
               </a:rPr>
-              <a:t>bridge.conf</a:t>
+              <a:t>firewall.conf</a:t>
             </a:r>
             <a:endParaRPr lang="en-GB" sz="1600" dirty="0">
               <a:latin typeface="Times New Roman" panose="02020603050405020304" pitchFamily="18" charset="0"/>
@@ -12636,7 +12636,7 @@
                 <a:latin typeface="Courier New" panose="02070309020205020404" pitchFamily="49" charset="0"/>
                 <a:cs typeface="Courier New" panose="02070309020205020404" pitchFamily="49" charset="0"/>
               </a:rPr>
-              <a:t>bridgeMode</a:t>
+              <a:t>firewallMode</a:t>
             </a:r>
             <a:r>
               <a:rPr lang="en-GB" sz="800" dirty="0">
@@ -13300,7 +13300,7 @@
                 <a:latin typeface="Times New Roman" panose="02020603050405020304" pitchFamily="18" charset="0"/>
                 <a:cs typeface="Times New Roman" panose="02020603050405020304" pitchFamily="18" charset="0"/>
               </a:rPr>
-              <a:t>bridge.conf</a:t>
+              <a:t>firewall.conf</a:t>
             </a:r>
             <a:endParaRPr lang="en-GB" sz="1600" dirty="0">
               <a:latin typeface="Times New Roman" panose="02020603050405020304" pitchFamily="18" charset="0"/>
@@ -13313,7 +13313,7 @@
                 <a:latin typeface="Courier New" panose="02070309020205020404" pitchFamily="49" charset="0"/>
                 <a:cs typeface="Courier New" panose="02070309020205020404" pitchFamily="49" charset="0"/>
               </a:rPr>
-              <a:t>bridgeMode</a:t>
+              <a:t>firewallMode</a:t>
             </a:r>
             <a:r>
               <a:rPr lang="en-GB" sz="800" dirty="0">
@@ -16217,7 +16217,7 @@
                 <a:latin typeface="Times New Roman" panose="02020603050405020304" pitchFamily="18" charset="0"/>
                 <a:cs typeface="Times New Roman" panose="02020603050405020304" pitchFamily="18" charset="0"/>
               </a:rPr>
-              <a:t>bridge.conf</a:t>
+              <a:t>firewall.conf</a:t>
             </a:r>
             <a:endParaRPr lang="en-GB" sz="1600" dirty="0">
               <a:latin typeface="Times New Roman" panose="02020603050405020304" pitchFamily="18" charset="0"/>
@@ -16230,7 +16230,7 @@
                 <a:latin typeface="Courier New" panose="02070309020205020404" pitchFamily="49" charset="0"/>
                 <a:cs typeface="Courier New" panose="02070309020205020404" pitchFamily="49" charset="0"/>
               </a:rPr>
-              <a:t>bridgeMode</a:t>
+              <a:t>firewallMode</a:t>
             </a:r>
             <a:r>
               <a:rPr lang="en-GB" sz="800" dirty="0">
@@ -16766,7 +16766,7 @@
                 <a:latin typeface="Times New Roman" panose="02020603050405020304" pitchFamily="18" charset="0"/>
                 <a:cs typeface="Times New Roman" panose="02020603050405020304" pitchFamily="18" charset="0"/>
               </a:rPr>
-              <a:t>bridge.conf</a:t>
+              <a:t>firewall.conf</a:t>
             </a:r>
             <a:endParaRPr lang="en-GB" sz="1600" dirty="0">
               <a:latin typeface="Times New Roman" panose="02020603050405020304" pitchFamily="18" charset="0"/>
@@ -16779,7 +16779,7 @@
                 <a:latin typeface="Courier New" panose="02070309020205020404" pitchFamily="49" charset="0"/>
                 <a:cs typeface="Courier New" panose="02070309020205020404" pitchFamily="49" charset="0"/>
               </a:rPr>
-              <a:t>bridgeMode</a:t>
+              <a:t>firewallMode</a:t>
             </a:r>
             <a:r>
               <a:rPr lang="en-GB" sz="800" dirty="0">
@@ -19822,7 +19822,7 @@
                 <a:latin typeface="Times New Roman" panose="02020603050405020304" pitchFamily="18" charset="0"/>
                 <a:cs typeface="Times New Roman" panose="02020603050405020304" pitchFamily="18" charset="0"/>
               </a:rPr>
-              <a:t>bridge.conf</a:t>
+              <a:t>firewall.conf</a:t>
             </a:r>
             <a:endParaRPr lang="en-GB" sz="1600" dirty="0">
               <a:latin typeface="Times New Roman" panose="02020603050405020304" pitchFamily="18" charset="0"/>
@@ -19835,7 +19835,7 @@
                 <a:latin typeface="Courier New" panose="02070309020205020404" pitchFamily="49" charset="0"/>
                 <a:cs typeface="Courier New" panose="02070309020205020404" pitchFamily="49" charset="0"/>
               </a:rPr>
-              <a:t>bridgeMode</a:t>
+              <a:t>firewallMode</a:t>
             </a:r>
             <a:r>
               <a:rPr lang="en-GB" sz="800" dirty="0">
@@ -20420,7 +20420,7 @@
                 <a:latin typeface="Times New Roman" panose="02020603050405020304" pitchFamily="18" charset="0"/>
                 <a:cs typeface="Times New Roman" panose="02020603050405020304" pitchFamily="18" charset="0"/>
               </a:rPr>
-              <a:t>bridge.conf</a:t>
+              <a:t>firewall.conf</a:t>
             </a:r>
             <a:r>
               <a:rPr lang="en-GB" sz="1600" dirty="0">
@@ -20457,7 +20457,7 @@
                 <a:latin typeface="Courier New" panose="02070309020205020404" pitchFamily="49" charset="0"/>
                 <a:cs typeface="Courier New" panose="02070309020205020404" pitchFamily="49" charset="0"/>
               </a:rPr>
-              <a:t>bridgeMode</a:t>
+              <a:t>firewallMode</a:t>
             </a:r>
             <a:r>
               <a:rPr lang="en-GB" sz="800" dirty="0">
@@ -22979,7 +22979,7 @@
                 <a:latin typeface="Times New Roman" panose="02020603050405020304" pitchFamily="18" charset="0"/>
                 <a:cs typeface="Times New Roman" panose="02020603050405020304" pitchFamily="18" charset="0"/>
               </a:rPr>
-              <a:t>bridge.conf</a:t>
+              <a:t>firewall.conf</a:t>
             </a:r>
             <a:endParaRPr lang="en-GB" sz="1600" dirty="0">
               <a:latin typeface="Times New Roman" panose="02020603050405020304" pitchFamily="18" charset="0"/>
@@ -22992,7 +22992,7 @@
                 <a:latin typeface="Courier New" panose="02070309020205020404" pitchFamily="49" charset="0"/>
                 <a:cs typeface="Courier New" panose="02070309020205020404" pitchFamily="49" charset="0"/>
               </a:rPr>
-              <a:t>bridgeMode</a:t>
+              <a:t>firewallMode</a:t>
             </a:r>
             <a:r>
               <a:rPr lang="en-GB" sz="780" dirty="0">
@@ -24849,7 +24849,7 @@
                 <a:latin typeface="Times New Roman" panose="02020603050405020304" pitchFamily="18" charset="0"/>
                 <a:cs typeface="Times New Roman" panose="02020603050405020304" pitchFamily="18" charset="0"/>
               </a:rPr>
-              <a:t>bridge.conf</a:t>
+              <a:t>firewall.conf</a:t>
             </a:r>
             <a:r>
               <a:rPr lang="en-GB" sz="1600" dirty="0">
@@ -24886,7 +24886,7 @@
                 <a:latin typeface="Courier New" panose="02070309020205020404" pitchFamily="49" charset="0"/>
                 <a:cs typeface="Courier New" panose="02070309020205020404" pitchFamily="49" charset="0"/>
               </a:rPr>
-              <a:t>bridgeMode</a:t>
+              <a:t>firewallMode</a:t>
             </a:r>
             <a:r>
               <a:rPr lang="en-GB" sz="800" dirty="0">
@@ -26893,7 +26893,7 @@
                 <a:latin typeface="Times New Roman" panose="02020603050405020304" pitchFamily="18" charset="0"/>
                 <a:cs typeface="Times New Roman" panose="02020603050405020304" pitchFamily="18" charset="0"/>
               </a:rPr>
-              <a:t>bridge.conf</a:t>
+              <a:t>firewall.conf</a:t>
             </a:r>
             <a:endParaRPr lang="en-GB" sz="1600" dirty="0">
               <a:latin typeface="Times New Roman" panose="02020603050405020304" pitchFamily="18" charset="0"/>
@@ -26906,7 +26906,7 @@
                 <a:latin typeface="Courier New" panose="02070309020205020404" pitchFamily="49" charset="0"/>
                 <a:cs typeface="Courier New" panose="02070309020205020404" pitchFamily="49" charset="0"/>
               </a:rPr>
-              <a:t>bridgeMode</a:t>
+              <a:t>firewallMode</a:t>
             </a:r>
             <a:r>
               <a:rPr lang="en-GB" sz="600" dirty="0">
@@ -28740,7 +28740,7 @@
                 <a:latin typeface="Times New Roman" panose="02020603050405020304" pitchFamily="18" charset="0"/>
                 <a:cs typeface="Times New Roman" panose="02020603050405020304" pitchFamily="18" charset="0"/>
               </a:rPr>
-              <a:t>bridge.conf</a:t>
+              <a:t>firewall.conf</a:t>
             </a:r>
             <a:r>
               <a:rPr lang="en-GB" sz="1600" dirty="0">
@@ -28777,7 +28777,7 @@
                 <a:latin typeface="Courier New" panose="02070309020205020404" pitchFamily="49" charset="0"/>
                 <a:cs typeface="Courier New" panose="02070309020205020404" pitchFamily="49" charset="0"/>
               </a:rPr>
-              <a:t>bridgeMode</a:t>
+              <a:t>firewallMode</a:t>
             </a:r>
             <a:r>
               <a:rPr lang="en-GB" sz="800" dirty="0">

</xml_diff>